<commit_message>
updates to chart decks
</commit_message>
<xml_diff>
--- a/docs/Fix-Politics-Aug06.pptx
+++ b/docs/Fix-Politics-Aug06.pptx
@@ -5,14 +5,14 @@
     <p:sldMasterId id="2147483648" r:id="rId1"/>
   </p:sldMasterIdLst>
   <p:notesMasterIdLst>
-    <p:notesMasterId r:id="rId7"/>
+    <p:notesMasterId r:id="rId8"/>
   </p:notesMasterIdLst>
   <p:sldIdLst>
-    <p:sldId id="256" r:id="rId2"/>
-    <p:sldId id="257" r:id="rId3"/>
-    <p:sldId id="264" r:id="rId4"/>
-    <p:sldId id="266" r:id="rId5"/>
-    <p:sldId id="265" r:id="rId6"/>
+    <p:sldId id="256" r:id="rId3"/>
+    <p:sldId id="257" r:id="rId4"/>
+    <p:sldId id="264" r:id="rId5"/>
+    <p:sldId id="266" r:id="rId6"/>
+    <p:sldId id="265" r:id="rId7"/>
   </p:sldIdLst>
   <p:sldSz cx="12192000" cy="6858000"/>
   <p:notesSz cx="6858000" cy="9144000"/>
@@ -111,11 +111,6 @@
       </a:defRPr>
     </a:lvl9pPr>
   </p:defaultTextStyle>
-  <p:extLst>
-    <p:ext uri="{EFAFB233-063F-42B5-8137-9DF3F51BA10A}">
-      <p15:sldGuideLst xmlns:p15="http://schemas.microsoft.com/office/powerpoint/2012/main"/>
-    </p:ext>
-  </p:extLst>
 </p:presentation>
 </file>
 
@@ -201,7 +196,6 @@
           <a:p>
             <a:fld id="{9F31221A-542D-9443-8954-D02697DC0401}" type="datetimeFigureOut">
               <a:rPr lang="en-US" smtClean="0"/>
-              <a:t>8/6/2020</a:t>
             </a:fld>
             <a:endParaRPr lang="en-US"/>
           </a:p>
@@ -268,6 +262,7 @@
               <a:rPr lang="en-US"/>
               <a:t>Click to edit Master text styles</a:t>
             </a:r>
+            <a:endParaRPr lang="en-US"/>
           </a:p>
           <a:p>
             <a:pPr lvl="1"/>
@@ -275,6 +270,7 @@
               <a:rPr lang="en-US"/>
               <a:t>Second level</a:t>
             </a:r>
+            <a:endParaRPr lang="en-US"/>
           </a:p>
           <a:p>
             <a:pPr lvl="2"/>
@@ -282,6 +278,7 @@
               <a:rPr lang="en-US"/>
               <a:t>Third level</a:t>
             </a:r>
+            <a:endParaRPr lang="en-US"/>
           </a:p>
           <a:p>
             <a:pPr lvl="3"/>
@@ -289,6 +286,7 @@
               <a:rPr lang="en-US"/>
               <a:t>Fourth level</a:t>
             </a:r>
+            <a:endParaRPr lang="en-US"/>
           </a:p>
           <a:p>
             <a:pPr lvl="4"/>
@@ -296,6 +294,7 @@
               <a:rPr lang="en-US"/>
               <a:t>Fifth level</a:t>
             </a:r>
+            <a:endParaRPr lang="en-US"/>
           </a:p>
         </p:txBody>
       </p:sp>
@@ -359,7 +358,6 @@
           <a:p>
             <a:fld id="{7C6A98DC-948B-B34E-B200-3F891AE16175}" type="slidenum">
               <a:rPr lang="en-US" smtClean="0"/>
-              <a:t>‹#›</a:t>
             </a:fld>
             <a:endParaRPr lang="en-US"/>
           </a:p>
@@ -518,6 +516,7 @@
               <a:rPr lang="en-US"/>
               <a:t>Click to edit Master title style</a:t>
             </a:r>
+            <a:endParaRPr lang="en-US"/>
           </a:p>
         </p:txBody>
       </p:sp>
@@ -582,6 +581,7 @@
               <a:rPr lang="en-US"/>
               <a:t>Click to edit Master subtitle style</a:t>
             </a:r>
+            <a:endParaRPr lang="en-US"/>
           </a:p>
         </p:txBody>
       </p:sp>
@@ -618,7 +618,6 @@
           <a:p>
             <a:fld id="{9161CE87-EC62-414E-B1E6-581F5896EDC6}" type="datetime4">
               <a:rPr lang="en-US" smtClean="0"/>
-              <a:t>August 6, 2020</a:t>
             </a:fld>
             <a:endParaRPr lang="en-US" dirty="0"/>
           </a:p>
@@ -641,7 +640,6 @@
           <a:p>
             <a:fld id="{567255F2-7D95-6D4F-8D41-D42AD07F8CE5}" type="slidenum">
               <a:rPr lang="en-US" smtClean="0"/>
-              <a:t>‹#›</a:t>
             </a:fld>
             <a:endParaRPr lang="en-US"/>
           </a:p>
@@ -749,6 +747,7 @@
               <a:rPr lang="en-US" dirty="0"/>
               <a:t>Click to edit Master title style</a:t>
             </a:r>
+            <a:endParaRPr lang="en-US" dirty="0"/>
           </a:p>
         </p:txBody>
       </p:sp>
@@ -777,7 +776,6 @@
           <a:p>
             <a:fld id="{567255F2-7D95-6D4F-8D41-D42AD07F8CE5}" type="slidenum">
               <a:rPr lang="en-US" smtClean="0"/>
-              <a:t>‹#›</a:t>
             </a:fld>
             <a:endParaRPr lang="en-US" dirty="0"/>
           </a:p>
@@ -885,6 +883,7 @@
               <a:rPr lang="en-US" dirty="0"/>
               <a:t>Click to edit Master title style</a:t>
             </a:r>
+            <a:endParaRPr lang="en-US" dirty="0"/>
           </a:p>
         </p:txBody>
       </p:sp>
@@ -913,7 +912,6 @@
           <a:p>
             <a:fld id="{567255F2-7D95-6D4F-8D41-D42AD07F8CE5}" type="slidenum">
               <a:rPr lang="en-US" smtClean="0"/>
-              <a:t>‹#›</a:t>
             </a:fld>
             <a:endParaRPr lang="en-US" dirty="0"/>
           </a:p>
@@ -921,13 +919,7 @@
       </p:sp>
       <p:sp>
         <p:nvSpPr>
-          <p:cNvPr id="6" name="Rectangle 5">
-            <a:extLst>
-              <a:ext uri="{FF2B5EF4-FFF2-40B4-BE49-F238E27FC236}">
-                <a16:creationId xmlns:a16="http://schemas.microsoft.com/office/drawing/2014/main" id="{A63F33AB-6C87-409A-9407-987B1841F846}"/>
-              </a:ext>
-            </a:extLst>
-          </p:cNvPr>
+          <p:cNvPr id="6" name="Rectangle 5"/>
           <p:cNvSpPr/>
           <p:nvPr userDrawn="1"/>
         </p:nvSpPr>
@@ -972,11 +964,6 @@
         </p:txBody>
       </p:sp>
     </p:spTree>
-    <p:extLst>
-      <p:ext uri="{BB962C8B-B14F-4D97-AF65-F5344CB8AC3E}">
-        <p14:creationId xmlns:p14="http://schemas.microsoft.com/office/powerpoint/2010/main" val="3772734845"/>
-      </p:ext>
-    </p:extLst>
   </p:cSld>
   <p:clrMapOvr>
     <a:masterClrMapping/>
@@ -1046,13 +1033,7 @@
       </p:sp>
       <p:pic>
         <p:nvPicPr>
-          <p:cNvPr id="6" name="Picture 5" descr="A picture containing screenshot&#10;&#10;Description automatically generated">
-            <a:extLst>
-              <a:ext uri="{FF2B5EF4-FFF2-40B4-BE49-F238E27FC236}">
-                <a16:creationId xmlns:a16="http://schemas.microsoft.com/office/drawing/2014/main" id="{92B91100-D60E-4B37-8B5F-265231B6F585}"/>
-              </a:ext>
-            </a:extLst>
-          </p:cNvPr>
+          <p:cNvPr id="6" name="Picture 5" descr="A picture containing screenshot&#10;&#10;Description automatically generated"/>
           <p:cNvPicPr>
             <a:picLocks noChangeAspect="1"/>
           </p:cNvPicPr>
@@ -1119,6 +1100,7 @@
               <a:rPr lang="en-US" dirty="0"/>
               <a:t>Click to edit Master title style</a:t>
             </a:r>
+            <a:endParaRPr lang="en-US" dirty="0"/>
           </a:p>
         </p:txBody>
       </p:sp>
@@ -1147,18 +1129,12 @@
           <a:p>
             <a:fld id="{567255F2-7D95-6D4F-8D41-D42AD07F8CE5}" type="slidenum">
               <a:rPr lang="en-US" smtClean="0"/>
-              <a:t>‹#›</a:t>
             </a:fld>
             <a:endParaRPr lang="en-US" dirty="0"/>
           </a:p>
         </p:txBody>
       </p:sp>
     </p:spTree>
-    <p:extLst>
-      <p:ext uri="{BB962C8B-B14F-4D97-AF65-F5344CB8AC3E}">
-        <p14:creationId xmlns:p14="http://schemas.microsoft.com/office/powerpoint/2010/main" val="1712583876"/>
-      </p:ext>
-    </p:extLst>
   </p:cSld>
   <p:clrMapOvr>
     <a:masterClrMapping/>
@@ -1222,6 +1198,7 @@
               <a:rPr lang="en-US"/>
               <a:t>Click to edit Master title style</a:t>
             </a:r>
+            <a:endParaRPr lang="en-US"/>
           </a:p>
         </p:txBody>
       </p:sp>
@@ -1255,6 +1232,7 @@
               <a:rPr lang="en-US"/>
               <a:t>Click to edit Master text styles</a:t>
             </a:r>
+            <a:endParaRPr lang="en-US"/>
           </a:p>
           <a:p>
             <a:pPr lvl="1"/>
@@ -1262,6 +1240,7 @@
               <a:rPr lang="en-US"/>
               <a:t>Second level</a:t>
             </a:r>
+            <a:endParaRPr lang="en-US"/>
           </a:p>
           <a:p>
             <a:pPr lvl="2"/>
@@ -1269,6 +1248,7 @@
               <a:rPr lang="en-US"/>
               <a:t>Third level</a:t>
             </a:r>
+            <a:endParaRPr lang="en-US"/>
           </a:p>
           <a:p>
             <a:pPr lvl="3"/>
@@ -1276,6 +1256,7 @@
               <a:rPr lang="en-US"/>
               <a:t>Fourth level</a:t>
             </a:r>
+            <a:endParaRPr lang="en-US"/>
           </a:p>
           <a:p>
             <a:pPr lvl="4"/>
@@ -1283,6 +1264,7 @@
               <a:rPr lang="en-US"/>
               <a:t>Fifth level</a:t>
             </a:r>
+            <a:endParaRPr lang="en-US"/>
           </a:p>
         </p:txBody>
       </p:sp>
@@ -1321,7 +1303,6 @@
           <a:p>
             <a:fld id="{567255F2-7D95-6D4F-8D41-D42AD07F8CE5}" type="slidenum">
               <a:rPr lang="en-US" smtClean="0"/>
-              <a:t>‹#›</a:t>
             </a:fld>
             <a:endParaRPr lang="en-US"/>
           </a:p>
@@ -1396,6 +1377,14 @@
               </a:rPr>
               <a:t>IBM Corporation © 2020</a:t>
             </a:r>
+            <a:endParaRPr lang="en-US" sz="1200" dirty="0">
+              <a:solidFill>
+                <a:schemeClr val="accent1">
+                  <a:lumMod val="20000"/>
+                  <a:lumOff val="80000"/>
+                </a:schemeClr>
+              </a:solidFill>
+            </a:endParaRPr>
           </a:p>
         </p:txBody>
       </p:sp>
@@ -1404,9 +1393,9 @@
   <p:clrMap bg1="lt1" tx1="dk1" bg2="lt2" tx2="dk2" accent1="accent1" accent2="accent2" accent3="accent3" accent4="accent4" accent5="accent5" accent6="accent6" hlink="hlink" folHlink="folHlink"/>
   <p:sldLayoutIdLst>
     <p:sldLayoutId id="2147483649" r:id="rId1"/>
-    <p:sldLayoutId id="2147483655" r:id="rId2"/>
-    <p:sldLayoutId id="2147483657" r:id="rId3"/>
-    <p:sldLayoutId id="2147483656" r:id="rId4"/>
+    <p:sldLayoutId id="2147483650" r:id="rId2"/>
+    <p:sldLayoutId id="2147483651" r:id="rId3"/>
+    <p:sldLayoutId id="2147483652" r:id="rId4"/>
   </p:sldLayoutIdLst>
   <p:hf hdr="0"/>
   <p:txStyles>
@@ -1741,6 +1730,7 @@
               <a:rPr lang="en-US" dirty="0"/>
               <a:t>(race) Call for Code</a:t>
             </a:r>
+            <a:endParaRPr lang="en-US" dirty="0"/>
           </a:p>
         </p:txBody>
       </p:sp>
@@ -1765,6 +1755,32 @@
               <a:rPr lang="en-US" dirty="0"/>
               <a:t>August 07, 2020</a:t>
             </a:r>
+            <a:endParaRPr lang="en-US" dirty="0"/>
+          </a:p>
+          <a:p>
+            <a:r>
+              <a:rPr lang="" altLang="en-US" dirty="0"/>
+              <a:t>Nikhil Raja, Tony Pearson</a:t>
+            </a:r>
+            <a:r>
+              <a:rPr lang="en-US" dirty="0"/>
+              <a:t>, Beth Morgan, Thomas Adams, </a:t>
+            </a:r>
+            <a:br>
+              <a:rPr lang="en-US" dirty="0"/>
+            </a:br>
+            <a:r>
+              <a:rPr lang="en-US" dirty="0"/>
+              <a:t>Oiza Dorgu, Lungelo Sikobi Jia Liang, Debra Scott, </a:t>
+            </a:r>
+            <a:br>
+              <a:rPr lang="en-US" dirty="0"/>
+            </a:br>
+            <a:r>
+              <a:rPr lang="en-US" dirty="0"/>
+              <a:t>Denise Knorr, Mao Vang Corne</a:t>
+            </a:r>
+            <a:endParaRPr lang="en-US" dirty="0"/>
           </a:p>
         </p:txBody>
       </p:sp>
@@ -1795,13 +1811,7 @@
       </p:grpSpPr>
       <p:sp>
         <p:nvSpPr>
-          <p:cNvPr id="2" name="Title 1">
-            <a:extLst>
-              <a:ext uri="{FF2B5EF4-FFF2-40B4-BE49-F238E27FC236}">
-                <a16:creationId xmlns:a16="http://schemas.microsoft.com/office/drawing/2014/main" id="{64174A3C-3F48-4619-BCF6-218F9DCAD3BC}"/>
-              </a:ext>
-            </a:extLst>
-          </p:cNvPr>
+          <p:cNvPr id="2" name="Title 1"/>
           <p:cNvSpPr>
             <a:spLocks noGrp="1"/>
           </p:cNvSpPr>
@@ -1820,18 +1830,13 @@
               <a:rPr lang="en-US" dirty="0"/>
               <a:t>Architecture Diagram – Web Application Framework</a:t>
             </a:r>
-          </a:p>
-        </p:txBody>
-      </p:sp>
-      <p:sp>
-        <p:nvSpPr>
-          <p:cNvPr id="4" name="Slide Number Placeholder 3">
-            <a:extLst>
-              <a:ext uri="{FF2B5EF4-FFF2-40B4-BE49-F238E27FC236}">
-                <a16:creationId xmlns:a16="http://schemas.microsoft.com/office/drawing/2014/main" id="{45F9BD57-6CED-42AB-9EE5-9DD05847E421}"/>
-              </a:ext>
-            </a:extLst>
-          </p:cNvPr>
+            <a:endParaRPr lang="en-US" dirty="0"/>
+          </a:p>
+        </p:txBody>
+      </p:sp>
+      <p:sp>
+        <p:nvSpPr>
+          <p:cNvPr id="4" name="Slide Number Placeholder 3"/>
           <p:cNvSpPr>
             <a:spLocks noGrp="1"/>
           </p:cNvSpPr>
@@ -1846,7 +1851,6 @@
           <a:p>
             <a:fld id="{567255F2-7D95-6D4F-8D41-D42AD07F8CE5}" type="slidenum">
               <a:rPr lang="en-US" smtClean="0"/>
-              <a:t>2</a:t>
             </a:fld>
             <a:endParaRPr lang="en-US" dirty="0"/>
           </a:p>
@@ -1854,13 +1858,7 @@
       </p:sp>
       <p:sp>
         <p:nvSpPr>
-          <p:cNvPr id="3" name="TextBox 2">
-            <a:extLst>
-              <a:ext uri="{FF2B5EF4-FFF2-40B4-BE49-F238E27FC236}">
-                <a16:creationId xmlns:a16="http://schemas.microsoft.com/office/drawing/2014/main" id="{E5FDBABE-398F-4E55-BE44-8535747D92F9}"/>
-              </a:ext>
-            </a:extLst>
-          </p:cNvPr>
+          <p:cNvPr id="3" name="TextBox 2"/>
           <p:cNvSpPr txBox="1"/>
           <p:nvPr/>
         </p:nvSpPr>
@@ -1884,51 +1882,50 @@
               <a:rPr lang="en-US" dirty="0"/>
               <a:t>Problem statement 1</a:t>
             </a:r>
+            <a:endParaRPr lang="en-US" dirty="0"/>
           </a:p>
           <a:p>
             <a:r>
               <a:rPr lang="en-US" dirty="0"/>
               <a:t>Concerned and impacted citizens don't have a straightforward way of knowing what or how policies and regulations impact them or what they can do in response.</a:t>
             </a:r>
-          </a:p>
-          <a:p>
             <a:endParaRPr lang="en-US" dirty="0"/>
           </a:p>
           <a:p>
+            <a:endParaRPr lang="en-US" dirty="0"/>
+          </a:p>
+          <a:p>
             <a:pPr marL="285750" indent="-285750">
-              <a:buFont typeface="Arial" panose="020B0604020202020204" pitchFamily="34" charset="0"/>
+              <a:buFont typeface="Arial" panose="02080604020202020204" pitchFamily="34" charset="0"/>
               <a:buChar char="•"/>
             </a:pPr>
             <a:r>
               <a:rPr lang="en-US" dirty="0"/>
               <a:t>Citizens are able to find and understand the specific impact of proposed policy without being a legal expert.</a:t>
             </a:r>
+            <a:endParaRPr lang="en-US" dirty="0"/>
           </a:p>
           <a:p>
             <a:pPr marL="285750" indent="-285750">
-              <a:buFont typeface="Arial" panose="020B0604020202020204" pitchFamily="34" charset="0"/>
+              <a:buFont typeface="Arial" panose="02080604020202020204" pitchFamily="34" charset="0"/>
               <a:buChar char="•"/>
             </a:pPr>
             <a:endParaRPr lang="en-US" dirty="0"/>
           </a:p>
           <a:p>
             <a:pPr marL="285750" indent="-285750">
-              <a:buFont typeface="Arial" panose="020B0604020202020204" pitchFamily="34" charset="0"/>
+              <a:buFont typeface="Arial" panose="02080604020202020204" pitchFamily="34" charset="0"/>
               <a:buChar char="•"/>
             </a:pPr>
             <a:r>
               <a:rPr lang="en-US" dirty="0"/>
               <a:t>Citizens are able to share opinions so they can influence policy decisions before they are finalized.</a:t>
             </a:r>
+            <a:endParaRPr lang="en-US" dirty="0"/>
           </a:p>
         </p:txBody>
       </p:sp>
     </p:spTree>
-    <p:extLst>
-      <p:ext uri="{BB962C8B-B14F-4D97-AF65-F5344CB8AC3E}">
-        <p14:creationId xmlns:p14="http://schemas.microsoft.com/office/powerpoint/2010/main" val="3829845791"/>
-      </p:ext>
-    </p:extLst>
   </p:cSld>
   <p:clrMapOvr>
     <a:masterClrMapping/>
@@ -1955,13 +1952,7 @@
       </p:grpSpPr>
       <p:sp>
         <p:nvSpPr>
-          <p:cNvPr id="2" name="Title 1">
-            <a:extLst>
-              <a:ext uri="{FF2B5EF4-FFF2-40B4-BE49-F238E27FC236}">
-                <a16:creationId xmlns:a16="http://schemas.microsoft.com/office/drawing/2014/main" id="{EF055AD8-934E-4279-9B32-1FF716822565}"/>
-              </a:ext>
-            </a:extLst>
-          </p:cNvPr>
+          <p:cNvPr id="2" name="Title 1"/>
           <p:cNvSpPr>
             <a:spLocks noGrp="1"/>
           </p:cNvSpPr>
@@ -1978,18 +1969,13 @@
               <a:rPr lang="en-US" dirty="0"/>
               <a:t>A Responsive Website with a consistent color theme</a:t>
             </a:r>
-          </a:p>
-        </p:txBody>
-      </p:sp>
-      <p:sp>
-        <p:nvSpPr>
-          <p:cNvPr id="3" name="Slide Number Placeholder 2">
-            <a:extLst>
-              <a:ext uri="{FF2B5EF4-FFF2-40B4-BE49-F238E27FC236}">
-                <a16:creationId xmlns:a16="http://schemas.microsoft.com/office/drawing/2014/main" id="{7A98055C-A505-4684-8346-BB820CB103BA}"/>
-              </a:ext>
-            </a:extLst>
-          </p:cNvPr>
+            <a:endParaRPr lang="en-US" dirty="0"/>
+          </a:p>
+        </p:txBody>
+      </p:sp>
+      <p:sp>
+        <p:nvSpPr>
+          <p:cNvPr id="3" name="Slide Number Placeholder 2"/>
           <p:cNvSpPr>
             <a:spLocks noGrp="1"/>
           </p:cNvSpPr>
@@ -2004,7 +1990,6 @@
           <a:p>
             <a:fld id="{567255F2-7D95-6D4F-8D41-D42AD07F8CE5}" type="slidenum">
               <a:rPr lang="en-US" smtClean="0"/>
-              <a:t>3</a:t>
             </a:fld>
             <a:endParaRPr lang="en-US" dirty="0"/>
           </a:p>
@@ -2012,22 +1997,18 @@
       </p:sp>
       <p:pic>
         <p:nvPicPr>
-          <p:cNvPr id="8" name="Picture 7">
-            <a:extLst>
-              <a:ext uri="{FF2B5EF4-FFF2-40B4-BE49-F238E27FC236}">
-                <a16:creationId xmlns:a16="http://schemas.microsoft.com/office/drawing/2014/main" id="{B62FBCBA-A7BD-495A-B8B9-F0309E18DC7A}"/>
-              </a:ext>
-            </a:extLst>
-          </p:cNvPr>
+          <p:cNvPr id="8" name="Picture 7"/>
           <p:cNvPicPr>
             <a:picLocks noChangeAspect="1"/>
           </p:cNvPicPr>
           <p:nvPr/>
         </p:nvPicPr>
         <p:blipFill rotWithShape="1">
-          <a:blip r:embed="rId2"/>
+          <a:blip r:embed="rId1"/>
           <a:srcRect b="25950"/>
-          <a:stretch/>
+          <a:stretch>
+            <a:fillRect/>
+          </a:stretch>
         </p:blipFill>
         <p:spPr>
           <a:xfrm>
@@ -2041,22 +2022,18 @@
       </p:pic>
       <p:pic>
         <p:nvPicPr>
-          <p:cNvPr id="9" name="Picture 8">
-            <a:extLst>
-              <a:ext uri="{FF2B5EF4-FFF2-40B4-BE49-F238E27FC236}">
-                <a16:creationId xmlns:a16="http://schemas.microsoft.com/office/drawing/2014/main" id="{5473A222-A5B0-47F3-8B52-A8BA7514C7D9}"/>
-              </a:ext>
-            </a:extLst>
-          </p:cNvPr>
+          <p:cNvPr id="9" name="Picture 8"/>
           <p:cNvPicPr>
             <a:picLocks noChangeAspect="1"/>
           </p:cNvPicPr>
           <p:nvPr/>
         </p:nvPicPr>
         <p:blipFill rotWithShape="1">
-          <a:blip r:embed="rId3"/>
+          <a:blip r:embed="rId2"/>
           <a:srcRect b="25950"/>
-          <a:stretch/>
+          <a:stretch>
+            <a:fillRect/>
+          </a:stretch>
         </p:blipFill>
         <p:spPr>
           <a:xfrm>
@@ -2070,13 +2047,7 @@
       </p:pic>
       <p:sp>
         <p:nvSpPr>
-          <p:cNvPr id="13" name="Freeform: Shape 12">
-            <a:extLst>
-              <a:ext uri="{FF2B5EF4-FFF2-40B4-BE49-F238E27FC236}">
-                <a16:creationId xmlns:a16="http://schemas.microsoft.com/office/drawing/2014/main" id="{03C608F2-CA6F-4114-9EE3-C8B8E13FE659}"/>
-              </a:ext>
-            </a:extLst>
-          </p:cNvPr>
+          <p:cNvPr id="13" name="Freeform: Shape 12"/>
           <p:cNvSpPr/>
           <p:nvPr/>
         </p:nvSpPr>
@@ -2168,11 +2139,6 @@
         </p:txBody>
       </p:sp>
     </p:spTree>
-    <p:extLst>
-      <p:ext uri="{BB962C8B-B14F-4D97-AF65-F5344CB8AC3E}">
-        <p14:creationId xmlns:p14="http://schemas.microsoft.com/office/powerpoint/2010/main" val="1501222791"/>
-      </p:ext>
-    </p:extLst>
   </p:cSld>
   <p:clrMapOvr>
     <a:masterClrMapping/>
@@ -2199,13 +2165,7 @@
       </p:grpSpPr>
       <p:sp>
         <p:nvSpPr>
-          <p:cNvPr id="2" name="Title 1">
-            <a:extLst>
-              <a:ext uri="{FF2B5EF4-FFF2-40B4-BE49-F238E27FC236}">
-                <a16:creationId xmlns:a16="http://schemas.microsoft.com/office/drawing/2014/main" id="{6FA4BF43-134D-4E1E-8E96-8879FC38B437}"/>
-              </a:ext>
-            </a:extLst>
-          </p:cNvPr>
+          <p:cNvPr id="2" name="Title 1"/>
           <p:cNvSpPr>
             <a:spLocks noGrp="1"/>
           </p:cNvSpPr>
@@ -2222,18 +2182,13 @@
               <a:rPr lang="en-US" dirty="0"/>
               <a:t>User Registration and Profile</a:t>
             </a:r>
-          </a:p>
-        </p:txBody>
-      </p:sp>
-      <p:sp>
-        <p:nvSpPr>
-          <p:cNvPr id="3" name="Slide Number Placeholder 2">
-            <a:extLst>
-              <a:ext uri="{FF2B5EF4-FFF2-40B4-BE49-F238E27FC236}">
-                <a16:creationId xmlns:a16="http://schemas.microsoft.com/office/drawing/2014/main" id="{79B2FF09-604A-4FD1-AF31-710DCB9AA565}"/>
-              </a:ext>
-            </a:extLst>
-          </p:cNvPr>
+            <a:endParaRPr lang="en-US" dirty="0"/>
+          </a:p>
+        </p:txBody>
+      </p:sp>
+      <p:sp>
+        <p:nvSpPr>
+          <p:cNvPr id="3" name="Slide Number Placeholder 2"/>
           <p:cNvSpPr>
             <a:spLocks noGrp="1"/>
           </p:cNvSpPr>
@@ -2248,7 +2203,6 @@
           <a:p>
             <a:fld id="{567255F2-7D95-6D4F-8D41-D42AD07F8CE5}" type="slidenum">
               <a:rPr lang="en-US" smtClean="0"/>
-              <a:t>4</a:t>
             </a:fld>
             <a:endParaRPr lang="en-US" dirty="0"/>
           </a:p>
@@ -2256,22 +2210,18 @@
       </p:sp>
       <p:pic>
         <p:nvPicPr>
-          <p:cNvPr id="7" name="Picture 6">
-            <a:extLst>
-              <a:ext uri="{FF2B5EF4-FFF2-40B4-BE49-F238E27FC236}">
-                <a16:creationId xmlns:a16="http://schemas.microsoft.com/office/drawing/2014/main" id="{8231F54E-567A-4F56-B6BD-66A4D5DD7D14}"/>
-              </a:ext>
-            </a:extLst>
-          </p:cNvPr>
+          <p:cNvPr id="7" name="Picture 6"/>
           <p:cNvPicPr>
             <a:picLocks noChangeAspect="1"/>
           </p:cNvPicPr>
           <p:nvPr/>
         </p:nvPicPr>
         <p:blipFill rotWithShape="1">
-          <a:blip r:embed="rId2"/>
+          <a:blip r:embed="rId1"/>
           <a:srcRect b="23689"/>
-          <a:stretch/>
+          <a:stretch>
+            <a:fillRect/>
+          </a:stretch>
         </p:blipFill>
         <p:spPr>
           <a:xfrm>
@@ -2285,22 +2235,18 @@
       </p:pic>
       <p:pic>
         <p:nvPicPr>
-          <p:cNvPr id="8" name="Picture 7">
-            <a:extLst>
-              <a:ext uri="{FF2B5EF4-FFF2-40B4-BE49-F238E27FC236}">
-                <a16:creationId xmlns:a16="http://schemas.microsoft.com/office/drawing/2014/main" id="{9EF41547-F4B8-4093-BC01-84E98E5F2C7B}"/>
-              </a:ext>
-            </a:extLst>
-          </p:cNvPr>
+          <p:cNvPr id="8" name="Picture 7"/>
           <p:cNvPicPr>
             <a:picLocks noChangeAspect="1"/>
           </p:cNvPicPr>
           <p:nvPr/>
         </p:nvPicPr>
         <p:blipFill rotWithShape="1">
-          <a:blip r:embed="rId3"/>
+          <a:blip r:embed="rId2"/>
           <a:srcRect b="23689"/>
-          <a:stretch/>
+          <a:stretch>
+            <a:fillRect/>
+          </a:stretch>
         </p:blipFill>
         <p:spPr>
           <a:xfrm>
@@ -2314,13 +2260,7 @@
       </p:pic>
       <p:sp>
         <p:nvSpPr>
-          <p:cNvPr id="9" name="Freeform: Shape 8">
-            <a:extLst>
-              <a:ext uri="{FF2B5EF4-FFF2-40B4-BE49-F238E27FC236}">
-                <a16:creationId xmlns:a16="http://schemas.microsoft.com/office/drawing/2014/main" id="{18850DF6-6037-4368-BE70-21983A7EE1F8}"/>
-              </a:ext>
-            </a:extLst>
-          </p:cNvPr>
+          <p:cNvPr id="9" name="Freeform: Shape 8"/>
           <p:cNvSpPr/>
           <p:nvPr/>
         </p:nvSpPr>
@@ -2412,11 +2352,6 @@
         </p:txBody>
       </p:sp>
     </p:spTree>
-    <p:extLst>
-      <p:ext uri="{BB962C8B-B14F-4D97-AF65-F5344CB8AC3E}">
-        <p14:creationId xmlns:p14="http://schemas.microsoft.com/office/powerpoint/2010/main" val="3806012898"/>
-      </p:ext>
-    </p:extLst>
   </p:cSld>
   <p:clrMapOvr>
     <a:masterClrMapping/>
@@ -2443,13 +2378,7 @@
       </p:grpSpPr>
       <p:sp>
         <p:nvSpPr>
-          <p:cNvPr id="2" name="Title 1">
-            <a:extLst>
-              <a:ext uri="{FF2B5EF4-FFF2-40B4-BE49-F238E27FC236}">
-                <a16:creationId xmlns:a16="http://schemas.microsoft.com/office/drawing/2014/main" id="{735ECF3B-F6DA-449E-9438-7F168ABF9AF2}"/>
-              </a:ext>
-            </a:extLst>
-          </p:cNvPr>
+          <p:cNvPr id="2" name="Title 1"/>
           <p:cNvSpPr>
             <a:spLocks noGrp="1"/>
           </p:cNvSpPr>
@@ -2466,18 +2395,13 @@
               <a:rPr lang="en-US" dirty="0"/>
               <a:t>Search Results  and  Next Steps</a:t>
             </a:r>
-          </a:p>
-        </p:txBody>
-      </p:sp>
-      <p:sp>
-        <p:nvSpPr>
-          <p:cNvPr id="3" name="Slide Number Placeholder 2">
-            <a:extLst>
-              <a:ext uri="{FF2B5EF4-FFF2-40B4-BE49-F238E27FC236}">
-                <a16:creationId xmlns:a16="http://schemas.microsoft.com/office/drawing/2014/main" id="{E5A3C5FD-96F6-46CC-8C6A-6DE5BA9A93BA}"/>
-              </a:ext>
-            </a:extLst>
-          </p:cNvPr>
+            <a:endParaRPr lang="en-US" dirty="0"/>
+          </a:p>
+        </p:txBody>
+      </p:sp>
+      <p:sp>
+        <p:nvSpPr>
+          <p:cNvPr id="3" name="Slide Number Placeholder 2"/>
           <p:cNvSpPr>
             <a:spLocks noGrp="1"/>
           </p:cNvSpPr>
@@ -2492,7 +2416,6 @@
           <a:p>
             <a:fld id="{567255F2-7D95-6D4F-8D41-D42AD07F8CE5}" type="slidenum">
               <a:rPr lang="en-US" smtClean="0"/>
-              <a:t>5</a:t>
             </a:fld>
             <a:endParaRPr lang="en-US" dirty="0"/>
           </a:p>
@@ -2500,20 +2423,14 @@
       </p:sp>
       <p:pic>
         <p:nvPicPr>
-          <p:cNvPr id="5" name="Picture 4">
-            <a:extLst>
-              <a:ext uri="{FF2B5EF4-FFF2-40B4-BE49-F238E27FC236}">
-                <a16:creationId xmlns:a16="http://schemas.microsoft.com/office/drawing/2014/main" id="{8EE9DE6E-718E-4880-82A6-F54DD613FD30}"/>
-              </a:ext>
-            </a:extLst>
-          </p:cNvPr>
+          <p:cNvPr id="5" name="Picture 4"/>
           <p:cNvPicPr>
             <a:picLocks noChangeAspect="1"/>
           </p:cNvPicPr>
           <p:nvPr/>
         </p:nvPicPr>
         <p:blipFill>
-          <a:blip r:embed="rId2"/>
+          <a:blip r:embed="rId1"/>
           <a:stretch>
             <a:fillRect/>
           </a:stretch>
@@ -2530,13 +2447,7 @@
       </p:pic>
       <p:sp>
         <p:nvSpPr>
-          <p:cNvPr id="7" name="TextBox 6">
-            <a:extLst>
-              <a:ext uri="{FF2B5EF4-FFF2-40B4-BE49-F238E27FC236}">
-                <a16:creationId xmlns:a16="http://schemas.microsoft.com/office/drawing/2014/main" id="{A62C9E62-BC54-45B3-B9DF-90174A172069}"/>
-              </a:ext>
-            </a:extLst>
-          </p:cNvPr>
+          <p:cNvPr id="7" name="TextBox 6"/>
           <p:cNvSpPr txBox="1"/>
           <p:nvPr/>
         </p:nvSpPr>
@@ -2564,6 +2475,11 @@
               </a:rPr>
               <a:t>Search Results:</a:t>
             </a:r>
+            <a:endParaRPr lang="en-US" dirty="0">
+              <a:solidFill>
+                <a:schemeClr val="bg1"/>
+              </a:solidFill>
+            </a:endParaRPr>
           </a:p>
           <a:p>
             <a:endParaRPr lang="en-US" dirty="0">
@@ -2581,6 +2497,11 @@
               </a:rPr>
               <a:t>The end goal is to have a list of results, that match the location  and list of impact areas selected, either anonymously or profile.</a:t>
             </a:r>
+            <a:endParaRPr lang="en-US" dirty="0">
+              <a:solidFill>
+                <a:schemeClr val="bg1"/>
+              </a:solidFill>
+            </a:endParaRPr>
           </a:p>
           <a:p>
             <a:endParaRPr lang="en-US" dirty="0">
@@ -2598,6 +2519,11 @@
               </a:rPr>
               <a:t>Each result entry has a laymen-readable title and summary.</a:t>
             </a:r>
+            <a:endParaRPr lang="en-US" dirty="0">
+              <a:solidFill>
+                <a:schemeClr val="bg1"/>
+              </a:solidFill>
+            </a:endParaRPr>
           </a:p>
           <a:p>
             <a:endParaRPr lang="en-US" dirty="0">
@@ -2615,8 +2541,6 @@
               </a:rPr>
               <a:t>Next Steps:</a:t>
             </a:r>
-          </a:p>
-          <a:p>
             <a:endParaRPr lang="en-US" dirty="0">
               <a:solidFill>
                 <a:schemeClr val="bg1"/>
@@ -2624,8 +2548,15 @@
             </a:endParaRPr>
           </a:p>
           <a:p>
+            <a:endParaRPr lang="en-US" dirty="0">
+              <a:solidFill>
+                <a:schemeClr val="bg1"/>
+              </a:solidFill>
+            </a:endParaRPr>
+          </a:p>
+          <a:p>
             <a:pPr marL="285750" indent="-285750">
-              <a:buFont typeface="Arial" panose="020B0604020202020204" pitchFamily="34" charset="0"/>
+              <a:buFont typeface="Arial" panose="02080604020202020204" pitchFamily="34" charset="0"/>
               <a:buChar char="•"/>
             </a:pPr>
             <a:r>
@@ -2636,10 +2567,15 @@
               </a:rPr>
               <a:t>Explore using persistent MariaDB or Postgresql database</a:t>
             </a:r>
+            <a:endParaRPr lang="en-US" dirty="0">
+              <a:solidFill>
+                <a:schemeClr val="bg1"/>
+              </a:solidFill>
+            </a:endParaRPr>
           </a:p>
           <a:p>
             <a:pPr marL="285750" indent="-285750">
-              <a:buFont typeface="Arial" panose="020B0604020202020204" pitchFamily="34" charset="0"/>
+              <a:buFont typeface="Arial" panose="02080604020202020204" pitchFamily="34" charset="0"/>
               <a:buChar char="•"/>
             </a:pPr>
             <a:r>
@@ -2650,10 +2586,15 @@
               </a:rPr>
               <a:t>Review websites, data sets and APIs available for legislation</a:t>
             </a:r>
+            <a:endParaRPr lang="en-US" dirty="0">
+              <a:solidFill>
+                <a:schemeClr val="bg1"/>
+              </a:solidFill>
+            </a:endParaRPr>
           </a:p>
           <a:p>
             <a:pPr marL="285750" indent="-285750">
-              <a:buFont typeface="Arial" panose="020B0604020202020204" pitchFamily="34" charset="0"/>
+              <a:buFont typeface="Arial" panose="02080604020202020204" pitchFamily="34" charset="0"/>
               <a:buChar char="•"/>
             </a:pPr>
             <a:r>
@@ -2664,10 +2605,15 @@
               </a:rPr>
               <a:t>Determine API or screen-scraping requirements to extra legal text of each proposed legislation</a:t>
             </a:r>
+            <a:endParaRPr lang="en-US" dirty="0">
+              <a:solidFill>
+                <a:schemeClr val="bg1"/>
+              </a:solidFill>
+            </a:endParaRPr>
           </a:p>
           <a:p>
             <a:pPr marL="285750" indent="-285750">
-              <a:buFont typeface="Arial" panose="020B0604020202020204" pitchFamily="34" charset="0"/>
+              <a:buFont typeface="Arial" panose="02080604020202020204" pitchFamily="34" charset="0"/>
               <a:buChar char="•"/>
             </a:pPr>
             <a:r>
@@ -2678,10 +2624,15 @@
               </a:rPr>
               <a:t>Natural Language Processing and Machine Learning for:</a:t>
             </a:r>
+            <a:endParaRPr lang="en-US" dirty="0">
+              <a:solidFill>
+                <a:schemeClr val="bg1"/>
+              </a:solidFill>
+            </a:endParaRPr>
           </a:p>
           <a:p>
             <a:pPr marL="742950" lvl="1" indent="-285750">
-              <a:buFont typeface="Arial" panose="020B0604020202020204" pitchFamily="34" charset="0"/>
+              <a:buFont typeface="Arial" panose="02080604020202020204" pitchFamily="34" charset="0"/>
               <a:buChar char="•"/>
             </a:pPr>
             <a:r>
@@ -2692,10 +2643,15 @@
               </a:rPr>
               <a:t>Classify by location and impact area</a:t>
             </a:r>
+            <a:endParaRPr lang="en-US" dirty="0">
+              <a:solidFill>
+                <a:schemeClr val="bg1"/>
+              </a:solidFill>
+            </a:endParaRPr>
           </a:p>
           <a:p>
             <a:pPr marL="742950" lvl="1" indent="-285750">
-              <a:buFont typeface="Arial" panose="020B0604020202020204" pitchFamily="34" charset="0"/>
+              <a:buFont typeface="Arial" panose="02080604020202020204" pitchFamily="34" charset="0"/>
               <a:buChar char="•"/>
             </a:pPr>
             <a:r>
@@ -2706,10 +2662,15 @@
               </a:rPr>
               <a:t>Laymen-readable title and summary</a:t>
             </a:r>
+            <a:endParaRPr lang="en-US" dirty="0">
+              <a:solidFill>
+                <a:schemeClr val="bg1"/>
+              </a:solidFill>
+            </a:endParaRPr>
           </a:p>
           <a:p>
             <a:pPr marL="285750" indent="-285750">
-              <a:buFont typeface="Arial" panose="020B0604020202020204" pitchFamily="34" charset="0"/>
+              <a:buFont typeface="Arial" panose="02080604020202020204" pitchFamily="34" charset="0"/>
               <a:buChar char="•"/>
             </a:pPr>
             <a:r>
@@ -2720,15 +2681,15 @@
               </a:rPr>
               <a:t>All API, screen scraping and ML processing done off-shift</a:t>
             </a:r>
+            <a:endParaRPr lang="en-US" dirty="0">
+              <a:solidFill>
+                <a:schemeClr val="bg1"/>
+              </a:solidFill>
+            </a:endParaRPr>
           </a:p>
         </p:txBody>
       </p:sp>
     </p:spTree>
-    <p:extLst>
-      <p:ext uri="{BB962C8B-B14F-4D97-AF65-F5344CB8AC3E}">
-        <p14:creationId xmlns:p14="http://schemas.microsoft.com/office/powerpoint/2010/main" val="2029130269"/>
-      </p:ext>
-    </p:extLst>
   </p:cSld>
   <p:clrMapOvr>
     <a:masterClrMapping/>
@@ -2987,8 +2948,6 @@
       </a:bgFillStyleLst>
     </a:fmtScheme>
   </a:themeElements>
-  <a:objectDefaults/>
-  <a:extraClrSchemeLst/>
   <a:extLst>
     <a:ext uri="{05A4C25C-085E-4340-85A3-A5531E510DB2}">
       <thm15:themeFamily xmlns:thm15="http://schemas.microsoft.com/office/thememl/2012/main" name="Office Theme" id="{62F939B6-93AF-4DB8-9C6B-D6C7DFDC589F}" vid="{4A3C46E8-61CC-4603-A589-7422A47A8E4A}"/>
@@ -3248,8 +3207,6 @@
       </a:bgFillStyleLst>
     </a:fmtScheme>
   </a:themeElements>
-  <a:objectDefaults/>
-  <a:extraClrSchemeLst/>
   <a:extLst>
     <a:ext uri="{05A4C25C-085E-4340-85A3-A5531E510DB2}">
       <thm15:themeFamily xmlns:thm15="http://schemas.microsoft.com/office/thememl/2012/main" name="Office Theme" id="{62F939B6-93AF-4DB8-9C6B-D6C7DFDC589F}" vid="{4A3C46E8-61CC-4603-A589-7422A47A8E4A}"/>

</xml_diff>